<commit_message>
Changed the description to use Date Factory for Joda Time in SystemDate.rst. #701
</commit_message>
<xml_diff>
--- a/source/ArchitectureInDetail/images_SystemDate/materialSystemDate.pptx
+++ b/source/ArchitectureInDetail/images_SystemDate/materialSystemDate.pptx
@@ -5,11 +5,12 @@
     <p:sldMasterId id="2147483648" r:id="rId1"/>
   </p:sldMasterIdLst>
   <p:notesMasterIdLst>
-    <p:notesMasterId r:id="rId4"/>
+    <p:notesMasterId r:id="rId5"/>
   </p:notesMasterIdLst>
   <p:sldIdLst>
     <p:sldId id="308" r:id="rId2"/>
     <p:sldId id="309" r:id="rId3"/>
+    <p:sldId id="310" r:id="rId4"/>
   </p:sldIdLst>
   <p:sldSz cx="9144000" cy="6858000" type="screen4x3"/>
   <p:notesSz cx="6858000" cy="9144000"/>
@@ -194,7 +195,7 @@
             <a:fld id="{3BB47352-BF5A-4CD2-B029-996118CD8E01}" type="datetimeFigureOut">
               <a:rPr kumimoji="1" lang="ja-JP" altLang="en-US" smtClean="0"/>
               <a:pPr/>
-              <a:t>2014/10/16</a:t>
+              <a:t>2015/1/9</a:t>
             </a:fld>
             <a:endParaRPr kumimoji="1" lang="ja-JP" altLang="en-US" dirty="0"/>
           </a:p>
@@ -677,7 +678,7 @@
             <a:fld id="{7B9B12EC-6AA0-374B-A2D3-850081A07A26}" type="datetimeFigureOut">
               <a:rPr kumimoji="1" lang="ja-JP" altLang="en-US" smtClean="0"/>
               <a:pPr/>
-              <a:t>2014/10/16</a:t>
+              <a:t>2015/1/9</a:t>
             </a:fld>
             <a:endParaRPr kumimoji="1" lang="ja-JP" altLang="en-US" dirty="0"/>
           </a:p>
@@ -881,7 +882,7 @@
             <a:fld id="{7B9B12EC-6AA0-374B-A2D3-850081A07A26}" type="datetimeFigureOut">
               <a:rPr kumimoji="1" lang="ja-JP" altLang="en-US" smtClean="0"/>
               <a:pPr/>
-              <a:t>2014/10/16</a:t>
+              <a:t>2015/1/9</a:t>
             </a:fld>
             <a:endParaRPr kumimoji="1" lang="ja-JP" altLang="en-US" dirty="0"/>
           </a:p>
@@ -1095,7 +1096,7 @@
             <a:fld id="{7B9B12EC-6AA0-374B-A2D3-850081A07A26}" type="datetimeFigureOut">
               <a:rPr kumimoji="1" lang="ja-JP" altLang="en-US" smtClean="0"/>
               <a:pPr/>
-              <a:t>2014/10/16</a:t>
+              <a:t>2015/1/9</a:t>
             </a:fld>
             <a:endParaRPr kumimoji="1" lang="ja-JP" altLang="en-US" dirty="0"/>
           </a:p>
@@ -1299,7 +1300,7 @@
             <a:fld id="{7B9B12EC-6AA0-374B-A2D3-850081A07A26}" type="datetimeFigureOut">
               <a:rPr kumimoji="1" lang="ja-JP" altLang="en-US" smtClean="0"/>
               <a:pPr/>
-              <a:t>2014/10/16</a:t>
+              <a:t>2015/1/9</a:t>
             </a:fld>
             <a:endParaRPr kumimoji="1" lang="ja-JP" altLang="en-US" dirty="0"/>
           </a:p>
@@ -1547,7 +1548,7 @@
             <a:fld id="{7B9B12EC-6AA0-374B-A2D3-850081A07A26}" type="datetimeFigureOut">
               <a:rPr kumimoji="1" lang="ja-JP" altLang="en-US" smtClean="0"/>
               <a:pPr/>
-              <a:t>2014/10/16</a:t>
+              <a:t>2015/1/9</a:t>
             </a:fld>
             <a:endParaRPr kumimoji="1" lang="ja-JP" altLang="en-US" dirty="0"/>
           </a:p>
@@ -1901,7 +1902,7 @@
             <a:fld id="{7B9B12EC-6AA0-374B-A2D3-850081A07A26}" type="datetimeFigureOut">
               <a:rPr kumimoji="1" lang="ja-JP" altLang="en-US" smtClean="0"/>
               <a:pPr/>
-              <a:t>2014/10/16</a:t>
+              <a:t>2015/1/9</a:t>
             </a:fld>
             <a:endParaRPr kumimoji="1" lang="ja-JP" altLang="en-US" dirty="0"/>
           </a:p>
@@ -2389,7 +2390,7 @@
             <a:fld id="{7B9B12EC-6AA0-374B-A2D3-850081A07A26}" type="datetimeFigureOut">
               <a:rPr kumimoji="1" lang="ja-JP" altLang="en-US" smtClean="0"/>
               <a:pPr/>
-              <a:t>2014/10/16</a:t>
+              <a:t>2015/1/9</a:t>
             </a:fld>
             <a:endParaRPr kumimoji="1" lang="ja-JP" altLang="en-US" dirty="0"/>
           </a:p>
@@ -2509,7 +2510,7 @@
             <a:fld id="{7B9B12EC-6AA0-374B-A2D3-850081A07A26}" type="datetimeFigureOut">
               <a:rPr kumimoji="1" lang="ja-JP" altLang="en-US" smtClean="0"/>
               <a:pPr/>
-              <a:t>2014/10/16</a:t>
+              <a:t>2015/1/9</a:t>
             </a:fld>
             <a:endParaRPr kumimoji="1" lang="ja-JP" altLang="en-US" dirty="0"/>
           </a:p>
@@ -2606,7 +2607,7 @@
             <a:fld id="{7B9B12EC-6AA0-374B-A2D3-850081A07A26}" type="datetimeFigureOut">
               <a:rPr kumimoji="1" lang="ja-JP" altLang="en-US" smtClean="0"/>
               <a:pPr/>
-              <a:t>2014/10/16</a:t>
+              <a:t>2015/1/9</a:t>
             </a:fld>
             <a:endParaRPr kumimoji="1" lang="ja-JP" altLang="en-US" dirty="0"/>
           </a:p>
@@ -2917,7 +2918,7 @@
             <a:fld id="{7B9B12EC-6AA0-374B-A2D3-850081A07A26}" type="datetimeFigureOut">
               <a:rPr kumimoji="1" lang="ja-JP" altLang="en-US" smtClean="0"/>
               <a:pPr/>
-              <a:t>2014/10/16</a:t>
+              <a:t>2015/1/9</a:t>
             </a:fld>
             <a:endParaRPr kumimoji="1" lang="ja-JP" altLang="en-US" dirty="0"/>
           </a:p>
@@ -3172,7 +3173,7 @@
             <a:fld id="{7B9B12EC-6AA0-374B-A2D3-850081A07A26}" type="datetimeFigureOut">
               <a:rPr kumimoji="1" lang="ja-JP" altLang="en-US" smtClean="0"/>
               <a:pPr/>
-              <a:t>2014/10/16</a:t>
+              <a:t>2015/1/9</a:t>
             </a:fld>
             <a:endParaRPr kumimoji="1" lang="ja-JP" altLang="en-US" dirty="0"/>
           </a:p>
@@ -3419,7 +3420,7 @@
             <a:fld id="{7B9B12EC-6AA0-374B-A2D3-850081A07A26}" type="datetimeFigureOut">
               <a:rPr kumimoji="1" lang="ja-JP" altLang="en-US" smtClean="0"/>
               <a:pPr/>
-              <a:t>2014/10/16</a:t>
+              <a:t>2015/1/9</a:t>
             </a:fld>
             <a:endParaRPr kumimoji="1" lang="ja-JP" altLang="en-US" dirty="0"/>
           </a:p>
@@ -7038,6 +7039,13 @@
   <p:clrMapOvr>
     <a:masterClrMapping/>
   </p:clrMapOvr>
+  <p:timing>
+    <p:tnLst>
+      <p:par>
+        <p:cTn id="1" dur="indefinite" restart="never" nodeType="tmRoot"/>
+      </p:par>
+    </p:tnLst>
+  </p:timing>
 </p:sld>
 </file>
 
@@ -9064,6 +9072,224 @@
   <p:clrMapOvr>
     <a:masterClrMapping/>
   </p:clrMapOvr>
+  <p:timing>
+    <p:tnLst>
+      <p:par>
+        <p:cTn id="1" dur="indefinite" restart="never" nodeType="tmRoot"/>
+      </p:par>
+    </p:tnLst>
+  </p:timing>
+</p:sld>
+</file>
+
+<file path=ppt/slides/slide3.xml><?xml version="1.0" encoding="utf-8"?>
+<p:sld xmlns:a="http://schemas.openxmlformats.org/drawingml/2006/main" xmlns:r="http://schemas.openxmlformats.org/officeDocument/2006/relationships" xmlns:p="http://schemas.openxmlformats.org/presentationml/2006/main">
+  <p:cSld>
+    <p:spTree>
+      <p:nvGrpSpPr>
+        <p:cNvPr id="1" name=""/>
+        <p:cNvGrpSpPr/>
+        <p:nvPr/>
+      </p:nvGrpSpPr>
+      <p:grpSpPr>
+        <a:xfrm>
+          <a:off x="0" y="0"/>
+          <a:ext cx="0" cy="0"/>
+          <a:chOff x="0" y="0"/>
+          <a:chExt cx="0" cy="0"/>
+        </a:xfrm>
+      </p:grpSpPr>
+      <p:pic>
+        <p:nvPicPr>
+          <p:cNvPr id="1033" name="Picture 9"/>
+          <p:cNvPicPr>
+            <a:picLocks noChangeAspect="1" noChangeArrowheads="1"/>
+          </p:cNvPicPr>
+          <p:nvPr/>
+        </p:nvPicPr>
+        <p:blipFill>
+          <a:blip r:embed="rId2">
+            <a:extLst>
+              <a:ext uri="{28A0092B-C50C-407E-A947-70E740481C1C}">
+                <a14:useLocalDpi xmlns:a14="http://schemas.microsoft.com/office/drawing/2010/main" val="0"/>
+              </a:ext>
+            </a:extLst>
+          </a:blip>
+          <a:srcRect/>
+          <a:stretch>
+            <a:fillRect/>
+          </a:stretch>
+        </p:blipFill>
+        <p:spPr bwMode="auto">
+          <a:xfrm>
+            <a:off x="-2324100" y="-1990725"/>
+            <a:ext cx="13792200" cy="10848975"/>
+          </a:xfrm>
+          <a:prstGeom prst="rect">
+            <a:avLst/>
+          </a:prstGeom>
+          <a:noFill/>
+          <a:ln>
+            <a:noFill/>
+          </a:ln>
+          <a:effectLst/>
+          <a:extLst>
+            <a:ext uri="{909E8E84-426E-40DD-AFC4-6F175D3DCCD1}">
+              <a14:hiddenFill xmlns:a14="http://schemas.microsoft.com/office/drawing/2010/main">
+                <a:solidFill>
+                  <a:schemeClr val="accent1"/>
+                </a:solidFill>
+              </a14:hiddenFill>
+            </a:ext>
+            <a:ext uri="{91240B29-F687-4F45-9708-019B960494DF}">
+              <a14:hiddenLine xmlns:a14="http://schemas.microsoft.com/office/drawing/2010/main" w="9525">
+                <a:solidFill>
+                  <a:schemeClr val="tx1"/>
+                </a:solidFill>
+                <a:miter lim="800000"/>
+                <a:headEnd/>
+                <a:tailEnd/>
+              </a14:hiddenLine>
+            </a:ext>
+            <a:ext uri="{AF507438-7753-43E0-B8FC-AC1667EBCBE1}">
+              <a14:hiddenEffects xmlns:a14="http://schemas.microsoft.com/office/drawing/2010/main">
+                <a:effectLst>
+                  <a:outerShdw dist="35921" dir="2700000" algn="ctr" rotWithShape="0">
+                    <a:schemeClr val="bg2"/>
+                  </a:outerShdw>
+                </a:effectLst>
+              </a14:hiddenEffects>
+            </a:ext>
+          </a:extLst>
+        </p:spPr>
+      </p:pic>
+      <p:sp>
+        <p:nvSpPr>
+          <p:cNvPr id="6" name="テキスト ボックス 5"/>
+          <p:cNvSpPr txBox="1"/>
+          <p:nvPr/>
+        </p:nvSpPr>
+        <p:spPr>
+          <a:xfrm>
+            <a:off x="6691085" y="-1277253"/>
+            <a:ext cx="4151086" cy="523220"/>
+          </a:xfrm>
+          <a:prstGeom prst="rect">
+            <a:avLst/>
+          </a:prstGeom>
+          <a:noFill/>
+        </p:spPr>
+        <p:txBody>
+          <a:bodyPr wrap="square" rtlCol="0">
+            <a:spAutoFit/>
+          </a:bodyPr>
+          <a:lstStyle/>
+          <a:p>
+            <a:r>
+              <a:rPr lang="en-US" altLang="ja-JP" sz="2800" b="1" dirty="0" err="1" smtClean="0"/>
+              <a:t>terasoluna</a:t>
+            </a:r>
+            <a:r>
+              <a:rPr lang="en-US" altLang="ja-JP" sz="2800" b="1" dirty="0" smtClean="0"/>
+              <a:t>-</a:t>
+            </a:r>
+            <a:r>
+              <a:rPr lang="en-US" altLang="ja-JP" sz="2800" b="1" dirty="0" err="1" smtClean="0"/>
+              <a:t>gfw</a:t>
+            </a:r>
+            <a:r>
+              <a:rPr lang="en-US" altLang="ja-JP" sz="2800" b="1" dirty="0" smtClean="0"/>
+              <a:t>-common</a:t>
+            </a:r>
+            <a:endParaRPr kumimoji="1" lang="ja-JP" altLang="en-US" sz="2800" b="1" dirty="0"/>
+          </a:p>
+        </p:txBody>
+      </p:sp>
+      <p:sp>
+        <p:nvSpPr>
+          <p:cNvPr id="14" name="テキスト ボックス 13"/>
+          <p:cNvSpPr txBox="1"/>
+          <p:nvPr/>
+        </p:nvSpPr>
+        <p:spPr>
+          <a:xfrm>
+            <a:off x="6698345" y="1284458"/>
+            <a:ext cx="4151086" cy="523220"/>
+          </a:xfrm>
+          <a:prstGeom prst="rect">
+            <a:avLst/>
+          </a:prstGeom>
+          <a:noFill/>
+        </p:spPr>
+        <p:txBody>
+          <a:bodyPr wrap="square" rtlCol="0">
+            <a:spAutoFit/>
+          </a:bodyPr>
+          <a:lstStyle/>
+          <a:p>
+            <a:r>
+              <a:rPr lang="en-US" altLang="ja-JP" sz="2800" b="1" dirty="0" err="1" smtClean="0"/>
+              <a:t>terasoluna-gfw-jodatime</a:t>
+            </a:r>
+            <a:endParaRPr kumimoji="1" lang="ja-JP" altLang="en-US" sz="2800" b="1" dirty="0"/>
+          </a:p>
+        </p:txBody>
+      </p:sp>
+      <p:sp>
+        <p:nvSpPr>
+          <p:cNvPr id="15" name="テキスト ボックス 14"/>
+          <p:cNvSpPr txBox="1"/>
+          <p:nvPr/>
+        </p:nvSpPr>
+        <p:spPr>
+          <a:xfrm>
+            <a:off x="-420914" y="7300654"/>
+            <a:ext cx="10508343" cy="523220"/>
+          </a:xfrm>
+          <a:prstGeom prst="rect">
+            <a:avLst/>
+          </a:prstGeom>
+          <a:noFill/>
+        </p:spPr>
+        <p:txBody>
+          <a:bodyPr wrap="square" rtlCol="0">
+            <a:spAutoFit/>
+          </a:bodyPr>
+          <a:lstStyle/>
+          <a:p>
+            <a:r>
+              <a:rPr lang="en-US" altLang="ja-JP" sz="2800" b="1" dirty="0">
+                <a:solidFill>
+                  <a:srgbClr val="FF0000"/>
+                </a:solidFill>
+              </a:rPr>
+              <a:t>Deprecated classes which exists for backward compatibility with 1.0.x</a:t>
+            </a:r>
+            <a:endParaRPr kumimoji="1" lang="ja-JP" altLang="en-US" sz="2800" b="1" dirty="0">
+              <a:solidFill>
+                <a:srgbClr val="FF0000"/>
+              </a:solidFill>
+            </a:endParaRPr>
+          </a:p>
+        </p:txBody>
+      </p:sp>
+    </p:spTree>
+    <p:extLst>
+      <p:ext uri="{BB962C8B-B14F-4D97-AF65-F5344CB8AC3E}">
+        <p14:creationId xmlns:p14="http://schemas.microsoft.com/office/powerpoint/2010/main" val="4207582033"/>
+      </p:ext>
+    </p:extLst>
+  </p:cSld>
+  <p:clrMapOvr>
+    <a:masterClrMapping/>
+  </p:clrMapOvr>
+  <p:timing>
+    <p:tnLst>
+      <p:par>
+        <p:cTn id="1" dur="indefinite" restart="never" nodeType="tmRoot"/>
+      </p:par>
+    </p:tnLst>
+  </p:timing>
 </p:sld>
 </file>
 

</xml_diff>